<commit_message>
Mise en ligne de la présentation d'Imane
</commit_message>
<xml_diff>
--- a/reports/presentation/kinocto_IM.pptx
+++ b/reports/presentation/kinocto_IM.pptx
@@ -5683,11 +5683,7 @@
           <a:p>
             <a:r>
               <a:rPr lang="fr-FR" dirty="0" smtClean="0"/>
-              <a:t>Extraction d’un </a:t>
-            </a:r>
-            <a:r>
-              <a:rPr lang="fr-FR" dirty="0" err="1" smtClean="0"/>
-              <a:t>sudocube</a:t>
+              <a:t>Localisation et orientation</a:t>
             </a:r>
             <a:endParaRPr lang="fr-FR" dirty="0"/>
           </a:p>
@@ -5706,54 +5702,70 @@
             </p:custDataLst>
           </p:nvPr>
         </p:nvSpPr>
-        <p:spPr/>
+        <p:spPr>
+          <a:xfrm>
+            <a:off x="1114424" y="1828800"/>
+            <a:ext cx="7610476" cy="4437529"/>
+          </a:xfrm>
+        </p:spPr>
         <p:txBody>
           <a:bodyPr>
             <a:normAutofit/>
           </a:bodyPr>
           <a:lstStyle/>
           <a:p>
+            <a:pPr marL="0" indent="0">
+              <a:buNone/>
+            </a:pPr>
+            <a:r>
+              <a:rPr lang="fr-FR" dirty="0" smtClean="0"/>
+              <a:t>On va travailler avec la Kinect et la caméra embarqué.</a:t>
+            </a:r>
+          </a:p>
+          <a:p>
             <a:pPr marL="0" indent="0"/>
             <a:r>
+              <a:rPr lang="fr-FR" b="1" dirty="0" smtClean="0"/>
+              <a:t>Kinect:</a:t>
+            </a:r>
+          </a:p>
+          <a:p>
+            <a:pPr marL="342900" lvl="1" indent="0"/>
+            <a:r>
               <a:rPr lang="fr-FR" dirty="0" smtClean="0"/>
-              <a:t>Lit les </a:t>
-            </a:r>
-            <a:r>
-              <a:rPr lang="fr-FR" dirty="0" err="1" smtClean="0"/>
-              <a:t>sudocubes</a:t>
-            </a:r>
+              <a:t>Va nous permettre de déterminer les distances avec les objets et le robot.</a:t>
+            </a:r>
+          </a:p>
+          <a:p>
+            <a:pPr marL="342900" lvl="1" indent="0"/>
             <a:r>
               <a:rPr lang="fr-FR" dirty="0" smtClean="0"/>
-              <a:t>, identifie les chiffres et la case rouge;</a:t>
-            </a:r>
-          </a:p>
-          <a:p>
-            <a:pPr marL="0" indent="0"/>
+              <a:t>Va nous permettre de déterminer la distance entre les obstacles.</a:t>
+            </a:r>
+          </a:p>
+          <a:p>
+            <a:pPr marL="342900" lvl="1" indent="0"/>
             <a:r>
               <a:rPr lang="fr-FR" dirty="0" smtClean="0"/>
-              <a:t>Robuste aux variations de la lumière;</a:t>
-            </a:r>
-          </a:p>
-          <a:p>
-            <a:pPr marL="0" indent="0"/>
+              <a:t>Il faut faire attention au </a:t>
+            </a:r>
+            <a:r>
+              <a:rPr lang="fr-FR" dirty="0" smtClean="0">
+                <a:solidFill>
+                  <a:srgbClr val="FF0000"/>
+                </a:solidFill>
+              </a:rPr>
+              <a:t>zone critique</a:t>
+            </a:r>
             <a:r>
               <a:rPr lang="fr-FR" dirty="0" smtClean="0"/>
-              <a:t>Testé sur 42 images (angles, distances et éclairages variés);</a:t>
-            </a:r>
-          </a:p>
-          <a:p>
-            <a:pPr marL="0" indent="0"/>
-            <a:r>
-              <a:rPr lang="fr-FR" dirty="0" smtClean="0"/>
-              <a:t>Taux d’erreurs faible (15 chiffres non lus sur 464);</a:t>
-            </a:r>
-          </a:p>
-          <a:p>
-            <a:pPr marL="0" indent="0"/>
-            <a:r>
-              <a:rPr lang="fr-FR" dirty="0" smtClean="0"/>
-              <a:t>Réduction du taux d’erreur en utilisant 3 images.</a:t>
-            </a:r>
+              <a:t>!!!( La zone où la Kinect aperçoit un obstacle, tandis que l’autre est en arrière, cela va déboussoler le robot).</a:t>
+            </a:r>
+          </a:p>
+          <a:p>
+            <a:pPr marL="0" indent="0">
+              <a:buNone/>
+            </a:pPr>
             <a:endParaRPr lang="fr-FR" dirty="0"/>
           </a:p>
         </p:txBody>
@@ -5820,327 +5832,19 @@
         </p:nvSpPr>
         <p:spPr/>
         <p:txBody>
-          <a:bodyPr/>
+          <a:bodyPr>
+            <a:normAutofit fontScale="90000"/>
+          </a:bodyPr>
           <a:lstStyle/>
           <a:p>
             <a:r>
               <a:rPr lang="fr-FR" dirty="0" smtClean="0"/>
-              <a:t>Extraction d’un </a:t>
-            </a:r>
-            <a:r>
-              <a:rPr lang="fr-FR" dirty="0" err="1" smtClean="0"/>
-              <a:t>sudocube</a:t>
+              <a:t>Image IR ET RGB prise avec la Kinect</a:t>
             </a:r>
             <a:endParaRPr lang="fr-FR" dirty="0"/>
           </a:p>
         </p:txBody>
       </p:sp>
-      <p:pic>
-        <p:nvPicPr>
-          <p:cNvPr id="4" name="Espace réservé du contenu 3" descr="28.png"/>
-          <p:cNvPicPr>
-            <a:picLocks noGrp="1" noChangeAspect="1"/>
-          </p:cNvPicPr>
-          <p:nvPr>
-            <p:ph idx="1"/>
-            <p:custDataLst>
-              <p:tags r:id="rId2"/>
-            </p:custDataLst>
-          </p:nvPr>
-        </p:nvPicPr>
-        <p:blipFill>
-          <a:blip r:embed="rId15"/>
-          <a:stretch>
-            <a:fillRect/>
-          </a:stretch>
-        </p:blipFill>
-        <p:spPr>
-          <a:xfrm>
-            <a:off x="437576" y="2239963"/>
-            <a:ext cx="3706372" cy="3670300"/>
-          </a:xfrm>
-        </p:spPr>
-      </p:pic>
-      <p:pic>
-        <p:nvPicPr>
-          <p:cNvPr id="5" name="Image 4" descr="28_1_0.png"/>
-          <p:cNvPicPr>
-            <a:picLocks noChangeAspect="1"/>
-          </p:cNvPicPr>
-          <p:nvPr>
-            <p:custDataLst>
-              <p:tags r:id="rId3"/>
-            </p:custDataLst>
-          </p:nvPr>
-        </p:nvPicPr>
-        <p:blipFill>
-          <a:blip r:embed="rId16"/>
-          <a:stretch>
-            <a:fillRect/>
-          </a:stretch>
-        </p:blipFill>
-        <p:spPr>
-          <a:xfrm>
-            <a:off x="4759322" y="3752850"/>
-            <a:ext cx="238125" cy="285750"/>
-          </a:xfrm>
-          <a:prstGeom prst="rect">
-            <a:avLst/>
-          </a:prstGeom>
-        </p:spPr>
-      </p:pic>
-      <p:pic>
-        <p:nvPicPr>
-          <p:cNvPr id="6" name="Image 5" descr="28_1_4.png"/>
-          <p:cNvPicPr>
-            <a:picLocks noChangeAspect="1"/>
-          </p:cNvPicPr>
-          <p:nvPr>
-            <p:custDataLst>
-              <p:tags r:id="rId4"/>
-            </p:custDataLst>
-          </p:nvPr>
-        </p:nvPicPr>
-        <p:blipFill>
-          <a:blip r:embed="rId17"/>
-          <a:stretch>
-            <a:fillRect/>
-          </a:stretch>
-        </p:blipFill>
-        <p:spPr>
-          <a:xfrm>
-            <a:off x="5116509" y="3752850"/>
-            <a:ext cx="238125" cy="285750"/>
-          </a:xfrm>
-          <a:prstGeom prst="rect">
-            <a:avLst/>
-          </a:prstGeom>
-        </p:spPr>
-      </p:pic>
-      <p:pic>
-        <p:nvPicPr>
-          <p:cNvPr id="7" name="Image 6" descr="28_2_5.png"/>
-          <p:cNvPicPr>
-            <a:picLocks noChangeAspect="1"/>
-          </p:cNvPicPr>
-          <p:nvPr>
-            <p:custDataLst>
-              <p:tags r:id="rId5"/>
-            </p:custDataLst>
-          </p:nvPr>
-        </p:nvPicPr>
-        <p:blipFill>
-          <a:blip r:embed="rId18"/>
-          <a:stretch>
-            <a:fillRect/>
-          </a:stretch>
-        </p:blipFill>
-        <p:spPr>
-          <a:xfrm>
-            <a:off x="5509321" y="3752850"/>
-            <a:ext cx="238125" cy="285750"/>
-          </a:xfrm>
-          <a:prstGeom prst="rect">
-            <a:avLst/>
-          </a:prstGeom>
-        </p:spPr>
-      </p:pic>
-      <p:pic>
-        <p:nvPicPr>
-          <p:cNvPr id="8" name="Image 7" descr="28_3_6.png"/>
-          <p:cNvPicPr>
-            <a:picLocks noChangeAspect="1"/>
-          </p:cNvPicPr>
-          <p:nvPr>
-            <p:custDataLst>
-              <p:tags r:id="rId6"/>
-            </p:custDataLst>
-          </p:nvPr>
-        </p:nvPicPr>
-        <p:blipFill>
-          <a:blip r:embed="rId19"/>
-          <a:stretch>
-            <a:fillRect/>
-          </a:stretch>
-        </p:blipFill>
-        <p:spPr>
-          <a:xfrm>
-            <a:off x="5871197" y="3752850"/>
-            <a:ext cx="238125" cy="285750"/>
-          </a:xfrm>
-          <a:prstGeom prst="rect">
-            <a:avLst/>
-          </a:prstGeom>
-        </p:spPr>
-      </p:pic>
-      <p:pic>
-        <p:nvPicPr>
-          <p:cNvPr id="9" name="Image 8" descr="28_4_3.png"/>
-          <p:cNvPicPr>
-            <a:picLocks noChangeAspect="1"/>
-          </p:cNvPicPr>
-          <p:nvPr>
-            <p:custDataLst>
-              <p:tags r:id="rId7"/>
-            </p:custDataLst>
-          </p:nvPr>
-        </p:nvPicPr>
-        <p:blipFill>
-          <a:blip r:embed="rId20"/>
-          <a:stretch>
-            <a:fillRect/>
-          </a:stretch>
-        </p:blipFill>
-        <p:spPr>
-          <a:xfrm>
-            <a:off x="6228385" y="3752850"/>
-            <a:ext cx="238125" cy="285750"/>
-          </a:xfrm>
-          <a:prstGeom prst="rect">
-            <a:avLst/>
-          </a:prstGeom>
-        </p:spPr>
-      </p:pic>
-      <p:pic>
-        <p:nvPicPr>
-          <p:cNvPr id="10" name="Image 9" descr="28_5_0.png"/>
-          <p:cNvPicPr>
-            <a:picLocks noChangeAspect="1"/>
-          </p:cNvPicPr>
-          <p:nvPr>
-            <p:custDataLst>
-              <p:tags r:id="rId8"/>
-            </p:custDataLst>
-          </p:nvPr>
-        </p:nvPicPr>
-        <p:blipFill>
-          <a:blip r:embed="rId21"/>
-          <a:stretch>
-            <a:fillRect/>
-          </a:stretch>
-        </p:blipFill>
-        <p:spPr>
-          <a:xfrm>
-            <a:off x="6534771" y="3752850"/>
-            <a:ext cx="238125" cy="285750"/>
-          </a:xfrm>
-          <a:prstGeom prst="rect">
-            <a:avLst/>
-          </a:prstGeom>
-        </p:spPr>
-      </p:pic>
-      <p:pic>
-        <p:nvPicPr>
-          <p:cNvPr id="11" name="Image 10" descr="28_5_5.png"/>
-          <p:cNvPicPr>
-            <a:picLocks noChangeAspect="1"/>
-          </p:cNvPicPr>
-          <p:nvPr>
-            <p:custDataLst>
-              <p:tags r:id="rId9"/>
-            </p:custDataLst>
-          </p:nvPr>
-        </p:nvPicPr>
-        <p:blipFill>
-          <a:blip r:embed="rId22"/>
-          <a:stretch>
-            <a:fillRect/>
-          </a:stretch>
-        </p:blipFill>
-        <p:spPr>
-          <a:xfrm>
-            <a:off x="6887385" y="3752850"/>
-            <a:ext cx="238125" cy="285750"/>
-          </a:xfrm>
-          <a:prstGeom prst="rect">
-            <a:avLst/>
-          </a:prstGeom>
-        </p:spPr>
-      </p:pic>
-      <p:pic>
-        <p:nvPicPr>
-          <p:cNvPr id="12" name="Image 11" descr="28_6_1.png"/>
-          <p:cNvPicPr>
-            <a:picLocks noChangeAspect="1"/>
-          </p:cNvPicPr>
-          <p:nvPr>
-            <p:custDataLst>
-              <p:tags r:id="rId10"/>
-            </p:custDataLst>
-          </p:nvPr>
-        </p:nvPicPr>
-        <p:blipFill>
-          <a:blip r:embed="rId23"/>
-          <a:stretch>
-            <a:fillRect/>
-          </a:stretch>
-        </p:blipFill>
-        <p:spPr>
-          <a:xfrm>
-            <a:off x="7233460" y="3752850"/>
-            <a:ext cx="238125" cy="285750"/>
-          </a:xfrm>
-          <a:prstGeom prst="rect">
-            <a:avLst/>
-          </a:prstGeom>
-        </p:spPr>
-      </p:pic>
-      <p:pic>
-        <p:nvPicPr>
-          <p:cNvPr id="13" name="Image 12" descr="28_6_3.png"/>
-          <p:cNvPicPr>
-            <a:picLocks noChangeAspect="1"/>
-          </p:cNvPicPr>
-          <p:nvPr>
-            <p:custDataLst>
-              <p:tags r:id="rId11"/>
-            </p:custDataLst>
-          </p:nvPr>
-        </p:nvPicPr>
-        <p:blipFill>
-          <a:blip r:embed="rId24"/>
-          <a:stretch>
-            <a:fillRect/>
-          </a:stretch>
-        </p:blipFill>
-        <p:spPr>
-          <a:xfrm>
-            <a:off x="7603348" y="3752850"/>
-            <a:ext cx="238125" cy="285750"/>
-          </a:xfrm>
-          <a:prstGeom prst="rect">
-            <a:avLst/>
-          </a:prstGeom>
-        </p:spPr>
-      </p:pic>
-      <p:pic>
-        <p:nvPicPr>
-          <p:cNvPr id="14" name="Image 13" descr="28_7_3.png"/>
-          <p:cNvPicPr>
-            <a:picLocks noChangeAspect="1"/>
-          </p:cNvPicPr>
-          <p:nvPr>
-            <p:custDataLst>
-              <p:tags r:id="rId12"/>
-            </p:custDataLst>
-          </p:nvPr>
-        </p:nvPicPr>
-        <p:blipFill>
-          <a:blip r:embed="rId25"/>
-          <a:stretch>
-            <a:fillRect/>
-          </a:stretch>
-        </p:blipFill>
-        <p:spPr>
-          <a:xfrm>
-            <a:off x="7955772" y="3752850"/>
-            <a:ext cx="238125" cy="285750"/>
-          </a:xfrm>
-          <a:prstGeom prst="rect">
-            <a:avLst/>
-          </a:prstGeom>
-        </p:spPr>
-      </p:pic>
       <p:sp>
         <p:nvSpPr>
           <p:cNvPr id="15" name="Espace réservé du contenu 2"/>
@@ -6149,7 +5853,7 @@
           </p:cNvSpPr>
           <p:nvPr>
             <p:custDataLst>
-              <p:tags r:id="rId13"/>
+              <p:tags r:id="rId2"/>
             </p:custDataLst>
           </p:nvPr>
         </p:nvSpPr>
@@ -6187,167 +5891,6 @@
               <a:tabLst/>
               <a:defRPr/>
             </a:pPr>
-            <a:r>
-              <a:rPr kumimoji="0" lang="fr-FR" sz="2000" b="0" i="0" u="none" strike="noStrike" kern="1200" cap="none" spc="0" normalizeH="0" baseline="0" noProof="0" dirty="0" smtClean="0">
-                <a:ln>
-                  <a:noFill/>
-                </a:ln>
-                <a:solidFill>
-                  <a:schemeClr val="tx1">
-                    <a:lumMod val="65000"/>
-                    <a:lumOff val="35000"/>
-                  </a:schemeClr>
-                </a:solidFill>
-                <a:effectLst/>
-                <a:uLnTx/>
-                <a:uFillTx/>
-                <a:latin typeface="+mn-lt"/>
-                <a:ea typeface="+mn-ea"/>
-                <a:cs typeface="+mn-cs"/>
-              </a:rPr>
-              <a:t>Exemple de</a:t>
-            </a:r>
-            <a:r>
-              <a:rPr kumimoji="0" lang="fr-FR" sz="2000" b="0" i="0" u="none" strike="noStrike" kern="1200" cap="none" spc="0" normalizeH="0" noProof="0" dirty="0" smtClean="0">
-                <a:ln>
-                  <a:noFill/>
-                </a:ln>
-                <a:solidFill>
-                  <a:schemeClr val="tx1">
-                    <a:lumMod val="65000"/>
-                    <a:lumOff val="35000"/>
-                  </a:schemeClr>
-                </a:solidFill>
-                <a:effectLst/>
-                <a:uLnTx/>
-                <a:uFillTx/>
-                <a:latin typeface="+mn-lt"/>
-                <a:ea typeface="+mn-ea"/>
-                <a:cs typeface="+mn-cs"/>
-              </a:rPr>
-              <a:t> </a:t>
-            </a:r>
-            <a:r>
-              <a:rPr kumimoji="0" lang="fr-FR" sz="2000" b="0" i="0" u="none" strike="noStrike" kern="1200" cap="none" spc="0" normalizeH="0" noProof="0" dirty="0" err="1" smtClean="0">
-                <a:ln>
-                  <a:noFill/>
-                </a:ln>
-                <a:solidFill>
-                  <a:schemeClr val="tx1">
-                    <a:lumMod val="65000"/>
-                    <a:lumOff val="35000"/>
-                  </a:schemeClr>
-                </a:solidFill>
-                <a:effectLst/>
-                <a:uLnTx/>
-                <a:uFillTx/>
-                <a:latin typeface="+mn-lt"/>
-                <a:ea typeface="+mn-ea"/>
-                <a:cs typeface="+mn-cs"/>
-              </a:rPr>
-              <a:t>sudocube</a:t>
-            </a:r>
-            <a:r>
-              <a:rPr kumimoji="0" lang="fr-FR" sz="2000" b="0" i="0" u="none" strike="noStrike" kern="1200" cap="none" spc="0" normalizeH="0" noProof="0" dirty="0" smtClean="0">
-                <a:ln>
-                  <a:noFill/>
-                </a:ln>
-                <a:solidFill>
-                  <a:schemeClr val="tx1">
-                    <a:lumMod val="65000"/>
-                    <a:lumOff val="35000"/>
-                  </a:schemeClr>
-                </a:solidFill>
-                <a:effectLst/>
-                <a:uLnTx/>
-                <a:uFillTx/>
-                <a:latin typeface="+mn-lt"/>
-                <a:ea typeface="+mn-ea"/>
-                <a:cs typeface="+mn-cs"/>
-              </a:rPr>
-              <a:t> traité </a:t>
-            </a:r>
-            <a:r>
-              <a:rPr kumimoji="0" lang="fr-FR" sz="2000" b="0" i="0" u="none" strike="noStrike" kern="1200" cap="none" spc="0" normalizeH="0" baseline="0" noProof="0" dirty="0" smtClean="0">
-                <a:ln>
-                  <a:noFill/>
-                </a:ln>
-                <a:solidFill>
-                  <a:schemeClr val="tx1">
-                    <a:lumMod val="65000"/>
-                    <a:lumOff val="35000"/>
-                  </a:schemeClr>
-                </a:solidFill>
-                <a:effectLst/>
-                <a:uLnTx/>
-                <a:uFillTx/>
-                <a:latin typeface="+mn-lt"/>
-                <a:ea typeface="+mn-ea"/>
-                <a:cs typeface="+mn-cs"/>
-              </a:rPr>
-              <a:t>et</a:t>
-            </a:r>
-            <a:r>
-              <a:rPr kumimoji="0" lang="fr-FR" sz="2000" b="0" i="0" u="none" strike="noStrike" kern="1200" cap="none" spc="0" normalizeH="0" noProof="0" dirty="0" smtClean="0">
-                <a:ln>
-                  <a:noFill/>
-                </a:ln>
-                <a:solidFill>
-                  <a:schemeClr val="tx1">
-                    <a:lumMod val="65000"/>
-                    <a:lumOff val="35000"/>
-                  </a:schemeClr>
-                </a:solidFill>
-                <a:effectLst/>
-                <a:uLnTx/>
-                <a:uFillTx/>
-                <a:latin typeface="+mn-lt"/>
-                <a:ea typeface="+mn-ea"/>
-                <a:cs typeface="+mn-cs"/>
-              </a:rPr>
-              <a:t> de c</a:t>
-            </a:r>
-            <a:r>
-              <a:rPr kumimoji="0" lang="fr-FR" sz="2000" b="0" i="0" u="none" strike="noStrike" kern="1200" cap="none" spc="0" normalizeH="0" baseline="0" noProof="0" dirty="0" smtClean="0">
-                <a:ln>
-                  <a:noFill/>
-                </a:ln>
-                <a:solidFill>
-                  <a:schemeClr val="tx1">
-                    <a:lumMod val="65000"/>
-                    <a:lumOff val="35000"/>
-                  </a:schemeClr>
-                </a:solidFill>
-                <a:effectLst/>
-                <a:uLnTx/>
-                <a:uFillTx/>
-                <a:latin typeface="+mn-lt"/>
-                <a:ea typeface="+mn-ea"/>
-                <a:cs typeface="+mn-cs"/>
-              </a:rPr>
-              <a:t>aractères lus.</a:t>
-            </a:r>
-            <a:r>
-              <a:rPr lang="fr-FR" sz="2000" dirty="0">
-                <a:solidFill>
-                  <a:schemeClr val="tx1">
-                    <a:lumMod val="65000"/>
-                    <a:lumOff val="35000"/>
-                  </a:schemeClr>
-                </a:solidFill>
-              </a:rPr>
-              <a:t/>
-            </a:r>
-            <a:br>
-              <a:rPr lang="fr-FR" sz="2000" dirty="0">
-                <a:solidFill>
-                  <a:schemeClr val="tx1">
-                    <a:lumMod val="65000"/>
-                    <a:lumOff val="35000"/>
-                  </a:schemeClr>
-                </a:solidFill>
-              </a:rPr>
-            </a:br>
             <a:endParaRPr kumimoji="0" lang="fr-FR" sz="2000" b="0" i="0" u="none" strike="noStrike" kern="1200" cap="none" spc="0" normalizeH="0" noProof="0" dirty="0" smtClean="0">
               <a:ln>
                 <a:noFill/>
@@ -6368,6 +5911,66 @@
           </a:p>
         </p:txBody>
       </p:sp>
+      <p:pic>
+        <p:nvPicPr>
+          <p:cNvPr id="16" name="Image 15"/>
+          <p:cNvPicPr>
+            <a:picLocks noChangeAspect="1"/>
+          </p:cNvPicPr>
+          <p:nvPr/>
+        </p:nvPicPr>
+        <p:blipFill>
+          <a:blip r:embed="rId4">
+            <a:extLst>
+              <a:ext uri="{28A0092B-C50C-407E-A947-70E740481C1C}">
+                <a14:useLocalDpi xmlns:a14="http://schemas.microsoft.com/office/drawing/2010/main" val="0"/>
+              </a:ext>
+            </a:extLst>
+          </a:blip>
+          <a:stretch>
+            <a:fillRect/>
+          </a:stretch>
+        </p:blipFill>
+        <p:spPr>
+          <a:xfrm>
+            <a:off x="158496" y="2240280"/>
+            <a:ext cx="4340352" cy="3255264"/>
+          </a:xfrm>
+          <a:prstGeom prst="rect">
+            <a:avLst/>
+          </a:prstGeom>
+        </p:spPr>
+      </p:pic>
+      <p:pic>
+        <p:nvPicPr>
+          <p:cNvPr id="17" name="Image 16"/>
+          <p:cNvPicPr>
+            <a:picLocks noChangeAspect="1"/>
+          </p:cNvPicPr>
+          <p:nvPr/>
+        </p:nvPicPr>
+        <p:blipFill>
+          <a:blip r:embed="rId5">
+            <a:extLst>
+              <a:ext uri="{28A0092B-C50C-407E-A947-70E740481C1C}">
+                <a14:useLocalDpi xmlns:a14="http://schemas.microsoft.com/office/drawing/2010/main" val="0"/>
+              </a:ext>
+            </a:extLst>
+          </a:blip>
+          <a:stretch>
+            <a:fillRect/>
+          </a:stretch>
+        </p:blipFill>
+        <p:spPr>
+          <a:xfrm>
+            <a:off x="4693920" y="2240280"/>
+            <a:ext cx="4290123" cy="3217592"/>
+          </a:xfrm>
+          <a:prstGeom prst="rect">
+            <a:avLst/>
+          </a:prstGeom>
+        </p:spPr>
+      </p:pic>
     </p:spTree>
     <p:extLst>
       <p:ext uri="{BB962C8B-B14F-4D97-AF65-F5344CB8AC3E}">
@@ -6435,7 +6038,7 @@
           <a:p>
             <a:r>
               <a:rPr lang="fr-FR" dirty="0" smtClean="0"/>
-              <a:t>Communication</a:t>
+              <a:t>Orientation</a:t>
             </a:r>
             <a:endParaRPr lang="fr-FR" dirty="0"/>
           </a:p>
@@ -6464,51 +6067,40 @@
             <a:pPr marL="0" indent="0"/>
             <a:r>
               <a:rPr lang="fr-FR" dirty="0" smtClean="0"/>
-              <a:t>Adresse IP du Mac mini envoyé au démarrage (</a:t>
-            </a:r>
-            <a:r>
-              <a:rPr lang="fr-FR" dirty="0" err="1" smtClean="0"/>
-              <a:t>pastebin</a:t>
-            </a:r>
+              <a:t>Pour l’orientation du robot, on va utiliser la caméra embarqué pour avoir plus de précision.</a:t>
+            </a:r>
+          </a:p>
+          <a:p>
+            <a:pPr marL="0" indent="0"/>
             <a:r>
               <a:rPr lang="fr-FR" dirty="0" smtClean="0"/>
-              <a:t>);</a:t>
+              <a:t>On a fait la calibration de la caméra avec l’algorithme de Zhang.</a:t>
             </a:r>
           </a:p>
           <a:p>
             <a:pPr marL="0" indent="0"/>
             <a:r>
               <a:rPr lang="fr-FR" dirty="0" smtClean="0"/>
-              <a:t>Communication entre Mac mini et station de base testé;</a:t>
-            </a:r>
-          </a:p>
-          <a:p>
-            <a:pPr marL="0" indent="0"/>
+              <a:t>On va extraire plusieurs paramètres avec le logiciel sur </a:t>
+            </a:r>
+            <a:r>
+              <a:rPr lang="fr-FR" dirty="0"/>
+              <a:t>W</a:t>
+            </a:r>
             <a:r>
               <a:rPr lang="fr-FR" dirty="0" smtClean="0"/>
-              <a:t>Utilisation de ROS pour gérer les messages;</a:t>
-            </a:r>
-          </a:p>
-          <a:p>
-            <a:pPr marL="342900" lvl="1" indent="0"/>
+              <a:t>indows</a:t>
+            </a:r>
             <a:r>
               <a:rPr lang="fr-FR" dirty="0" smtClean="0"/>
-              <a:t>Messages, services, actions, sérialisation, typage automatique</a:t>
-            </a:r>
-          </a:p>
-          <a:p>
-            <a:pPr marL="0" indent="0"/>
-            <a:r>
-              <a:rPr lang="fr-FR" dirty="0" smtClean="0"/>
-              <a:t>Débit rapide des messages.</a:t>
-            </a:r>
-          </a:p>
-          <a:p>
-            <a:pPr marL="0" indent="0"/>
+              <a:t>, pour différentes positions de la caméra.</a:t>
+            </a:r>
             <a:endParaRPr lang="fr-FR" dirty="0" smtClean="0"/>
           </a:p>
           <a:p>
-            <a:pPr marL="0" indent="0"/>
+            <a:pPr marL="0" indent="0">
+              <a:buNone/>
+            </a:pPr>
             <a:endParaRPr lang="fr-FR" dirty="0"/>
           </a:p>
         </p:txBody>
@@ -6580,7 +6172,7 @@
           <a:p>
             <a:r>
               <a:rPr lang="fr-FR" dirty="0" smtClean="0"/>
-              <a:t>Technologies utilisées</a:t>
+              <a:t>Repères pour l’orientation</a:t>
             </a:r>
             <a:endParaRPr lang="fr-FR" dirty="0"/>
           </a:p>
@@ -6609,65 +6201,47 @@
             <a:pPr marL="0" indent="0"/>
             <a:r>
               <a:rPr lang="fr-FR" dirty="0" smtClean="0"/>
-              <a:t>Vision : </a:t>
-            </a:r>
-            <a:r>
-              <a:rPr lang="fr-FR" dirty="0" err="1" smtClean="0"/>
-              <a:t>OpenCV</a:t>
-            </a:r>
+              <a:t>La ligne rouge sur la table: Cette ligne va nous permettre d’orienter notre robot grâce à des règles de trigonométrie.</a:t>
+            </a:r>
+          </a:p>
+          <a:p>
+            <a:pPr marL="0" indent="0"/>
             <a:r>
               <a:rPr lang="fr-FR" dirty="0" smtClean="0"/>
-              <a:t> et </a:t>
-            </a:r>
-            <a:r>
-              <a:rPr lang="fr-FR" dirty="0" err="1" smtClean="0"/>
-              <a:t>OpenNI</a:t>
+              <a:t> Les coins de la table(bleu et orange), pour cette partie on va programmer la caméra à ce quel prenne plusieurs photos, jusqu’à trouver ce qu’on retrouv</a:t>
+            </a:r>
+            <a:r>
+              <a:rPr lang="fr-FR" dirty="0" smtClean="0"/>
+              <a:t>e notre orientation:</a:t>
             </a:r>
             <a:endParaRPr lang="fr-FR" dirty="0" smtClean="0"/>
           </a:p>
           <a:p>
-            <a:pPr marL="0" indent="0"/>
+            <a:pPr marL="342900" lvl="1" indent="0"/>
             <a:r>
               <a:rPr lang="fr-FR" dirty="0" smtClean="0"/>
-              <a:t> Programmation : </a:t>
-            </a:r>
-            <a:r>
-              <a:rPr lang="fr-FR" dirty="0" err="1" smtClean="0"/>
-              <a:t>Bash</a:t>
-            </a:r>
+              <a:t>N: On voit le coin orange avant le bleu.</a:t>
+            </a:r>
+          </a:p>
+          <a:p>
+            <a:pPr marL="342900" lvl="1" indent="0"/>
             <a:r>
               <a:rPr lang="fr-FR" dirty="0" smtClean="0"/>
-              <a:t>, Python, C++, C</a:t>
-            </a:r>
-          </a:p>
-          <a:p>
-            <a:pPr marL="0" indent="0"/>
+              <a:t> S: On voit le coin bleu avant l’orange.</a:t>
+            </a:r>
+          </a:p>
+          <a:p>
+            <a:pPr marL="342900" lvl="1" indent="0"/>
             <a:r>
               <a:rPr lang="fr-FR" dirty="0" smtClean="0"/>
-              <a:t> Tests : </a:t>
-            </a:r>
-            <a:r>
-              <a:rPr lang="fr-FR" dirty="0" err="1" smtClean="0"/>
-              <a:t>GTest</a:t>
-            </a:r>
+              <a:t> E: On voit les deux coins bleus.</a:t>
+            </a:r>
+          </a:p>
+          <a:p>
+            <a:pPr marL="342900" lvl="1" indent="0"/>
             <a:r>
               <a:rPr lang="fr-FR" dirty="0" smtClean="0"/>
-              <a:t>, </a:t>
-            </a:r>
-            <a:r>
-              <a:rPr lang="fr-FR" dirty="0" err="1" smtClean="0"/>
-              <a:t>Valgrind</a:t>
-            </a:r>
-            <a:r>
-              <a:rPr lang="fr-FR" dirty="0" smtClean="0"/>
-              <a:t> (fuite de mémoires)</a:t>
-            </a:r>
-          </a:p>
-          <a:p>
-            <a:pPr marL="0" indent="0"/>
-            <a:r>
-              <a:rPr lang="fr-FR" dirty="0" smtClean="0"/>
-              <a:t>Communication : ROS</a:t>
+              <a:t>O: On voit les deux coins oranges.</a:t>
             </a:r>
             <a:endParaRPr lang="fr-FR" dirty="0"/>
           </a:p>
@@ -6709,66 +6283,6 @@
 </p:tagLst>
 </file>
 
-<file path=ppt/tags/tag10.xml><?xml version="1.0" encoding="utf-8"?>
-<p:tagLst xmlns:a="http://schemas.openxmlformats.org/drawingml/2006/main" xmlns:r="http://schemas.openxmlformats.org/officeDocument/2006/relationships" xmlns:p="http://schemas.openxmlformats.org/presentationml/2006/main">
-  <p:tag name="NUM" val="8"/>
-</p:tagLst>
-</file>
-
-<file path=ppt/tags/tag11.xml><?xml version="1.0" encoding="utf-8"?>
-<p:tagLst xmlns:a="http://schemas.openxmlformats.org/drawingml/2006/main" xmlns:r="http://schemas.openxmlformats.org/officeDocument/2006/relationships" xmlns:p="http://schemas.openxmlformats.org/presentationml/2006/main">
-  <p:tag name="NUM" val="9"/>
-</p:tagLst>
-</file>
-
-<file path=ppt/tags/tag12.xml><?xml version="1.0" encoding="utf-8"?>
-<p:tagLst xmlns:a="http://schemas.openxmlformats.org/drawingml/2006/main" xmlns:r="http://schemas.openxmlformats.org/officeDocument/2006/relationships" xmlns:p="http://schemas.openxmlformats.org/presentationml/2006/main">
-  <p:tag name="NUM" val="10"/>
-</p:tagLst>
-</file>
-
-<file path=ppt/tags/tag13.xml><?xml version="1.0" encoding="utf-8"?>
-<p:tagLst xmlns:a="http://schemas.openxmlformats.org/drawingml/2006/main" xmlns:r="http://schemas.openxmlformats.org/officeDocument/2006/relationships" xmlns:p="http://schemas.openxmlformats.org/presentationml/2006/main">
-  <p:tag name="NUM" val="11"/>
-</p:tagLst>
-</file>
-
-<file path=ppt/tags/tag14.xml><?xml version="1.0" encoding="utf-8"?>
-<p:tagLst xmlns:a="http://schemas.openxmlformats.org/drawingml/2006/main" xmlns:r="http://schemas.openxmlformats.org/officeDocument/2006/relationships" xmlns:p="http://schemas.openxmlformats.org/presentationml/2006/main">
-  <p:tag name="NUM" val="12"/>
-</p:tagLst>
-</file>
-
-<file path=ppt/tags/tag15.xml><?xml version="1.0" encoding="utf-8"?>
-<p:tagLst xmlns:a="http://schemas.openxmlformats.org/drawingml/2006/main" xmlns:r="http://schemas.openxmlformats.org/officeDocument/2006/relationships" xmlns:p="http://schemas.openxmlformats.org/presentationml/2006/main">
-  <p:tag name="NUM" val="13"/>
-</p:tagLst>
-</file>
-
-<file path=ppt/tags/tag16.xml><?xml version="1.0" encoding="utf-8"?>
-<p:tagLst xmlns:a="http://schemas.openxmlformats.org/drawingml/2006/main" xmlns:r="http://schemas.openxmlformats.org/officeDocument/2006/relationships" xmlns:p="http://schemas.openxmlformats.org/presentationml/2006/main">
-  <p:tag name="NUM" val="1"/>
-</p:tagLst>
-</file>
-
-<file path=ppt/tags/tag17.xml><?xml version="1.0" encoding="utf-8"?>
-<p:tagLst xmlns:a="http://schemas.openxmlformats.org/drawingml/2006/main" xmlns:r="http://schemas.openxmlformats.org/officeDocument/2006/relationships" xmlns:p="http://schemas.openxmlformats.org/presentationml/2006/main">
-  <p:tag name="NUM" val="2"/>
-</p:tagLst>
-</file>
-
-<file path=ppt/tags/tag18.xml><?xml version="1.0" encoding="utf-8"?>
-<p:tagLst xmlns:a="http://schemas.openxmlformats.org/drawingml/2006/main" xmlns:r="http://schemas.openxmlformats.org/officeDocument/2006/relationships" xmlns:p="http://schemas.openxmlformats.org/presentationml/2006/main">
-  <p:tag name="NUM" val="1"/>
-</p:tagLst>
-</file>
-
-<file path=ppt/tags/tag19.xml><?xml version="1.0" encoding="utf-8"?>
-<p:tagLst xmlns:a="http://schemas.openxmlformats.org/drawingml/2006/main" xmlns:r="http://schemas.openxmlformats.org/officeDocument/2006/relationships" xmlns:p="http://schemas.openxmlformats.org/presentationml/2006/main">
-  <p:tag name="NUM" val="2"/>
-</p:tagLst>
-</file>
-
 <file path=ppt/tags/tag2.xml><?xml version="1.0" encoding="utf-8"?>
 <p:tagLst xmlns:a="http://schemas.openxmlformats.org/drawingml/2006/main" xmlns:r="http://schemas.openxmlformats.org/officeDocument/2006/relationships" xmlns:p="http://schemas.openxmlformats.org/presentationml/2006/main">
   <p:tag name="NUM" val="2"/>
@@ -6783,37 +6297,31 @@
 
 <file path=ppt/tags/tag4.xml><?xml version="1.0" encoding="utf-8"?>
 <p:tagLst xmlns:a="http://schemas.openxmlformats.org/drawingml/2006/main" xmlns:r="http://schemas.openxmlformats.org/officeDocument/2006/relationships" xmlns:p="http://schemas.openxmlformats.org/presentationml/2006/main">
-  <p:tag name="NUM" val="2"/>
+  <p:tag name="NUM" val="13"/>
 </p:tagLst>
 </file>
 
 <file path=ppt/tags/tag5.xml><?xml version="1.0" encoding="utf-8"?>
 <p:tagLst xmlns:a="http://schemas.openxmlformats.org/drawingml/2006/main" xmlns:r="http://schemas.openxmlformats.org/officeDocument/2006/relationships" xmlns:p="http://schemas.openxmlformats.org/presentationml/2006/main">
-  <p:tag name="NUM" val="3"/>
+  <p:tag name="NUM" val="1"/>
 </p:tagLst>
 </file>
 
 <file path=ppt/tags/tag6.xml><?xml version="1.0" encoding="utf-8"?>
 <p:tagLst xmlns:a="http://schemas.openxmlformats.org/drawingml/2006/main" xmlns:r="http://schemas.openxmlformats.org/officeDocument/2006/relationships" xmlns:p="http://schemas.openxmlformats.org/presentationml/2006/main">
-  <p:tag name="NUM" val="4"/>
+  <p:tag name="NUM" val="2"/>
 </p:tagLst>
 </file>
 
 <file path=ppt/tags/tag7.xml><?xml version="1.0" encoding="utf-8"?>
 <p:tagLst xmlns:a="http://schemas.openxmlformats.org/drawingml/2006/main" xmlns:r="http://schemas.openxmlformats.org/officeDocument/2006/relationships" xmlns:p="http://schemas.openxmlformats.org/presentationml/2006/main">
-  <p:tag name="NUM" val="5"/>
+  <p:tag name="NUM" val="1"/>
 </p:tagLst>
 </file>
 
 <file path=ppt/tags/tag8.xml><?xml version="1.0" encoding="utf-8"?>
 <p:tagLst xmlns:a="http://schemas.openxmlformats.org/drawingml/2006/main" xmlns:r="http://schemas.openxmlformats.org/officeDocument/2006/relationships" xmlns:p="http://schemas.openxmlformats.org/presentationml/2006/main">
-  <p:tag name="NUM" val="6"/>
-</p:tagLst>
-</file>
-
-<file path=ppt/tags/tag9.xml><?xml version="1.0" encoding="utf-8"?>
-<p:tagLst xmlns:a="http://schemas.openxmlformats.org/drawingml/2006/main" xmlns:r="http://schemas.openxmlformats.org/officeDocument/2006/relationships" xmlns:p="http://schemas.openxmlformats.org/presentationml/2006/main">
-  <p:tag name="NUM" val="7"/>
+  <p:tag name="NUM" val="2"/>
 </p:tagLst>
 </file>
 

</xml_diff>

<commit_message>
Modification de ma partie de présentation
</commit_message>
<xml_diff>
--- a/reports/presentation/kinocto_IM.pptx
+++ b/reports/presentation/kinocto_IM.pptx
@@ -5,16 +5,14 @@
     <p:sldMasterId id="2147484076" r:id="rId1"/>
   </p:sldMasterIdLst>
   <p:notesMasterIdLst>
-    <p:notesMasterId r:id="rId6"/>
+    <p:notesMasterId r:id="rId4"/>
   </p:notesMasterIdLst>
   <p:handoutMasterIdLst>
-    <p:handoutMasterId r:id="rId7"/>
+    <p:handoutMasterId r:id="rId5"/>
   </p:handoutMasterIdLst>
   <p:sldIdLst>
     <p:sldId id="320" r:id="rId2"/>
-    <p:sldId id="322" r:id="rId3"/>
-    <p:sldId id="323" r:id="rId4"/>
-    <p:sldId id="321" r:id="rId5"/>
+    <p:sldId id="323" r:id="rId3"/>
   </p:sldIdLst>
   <p:sldSz cx="9144000" cy="6858000" type="screen4x3"/>
   <p:notesSz cx="6858000" cy="9144000"/>
@@ -5704,8 +5702,8 @@
         </p:nvSpPr>
         <p:spPr>
           <a:xfrm>
-            <a:off x="1114424" y="1828800"/>
-            <a:ext cx="7610476" cy="4437529"/>
+            <a:off x="405765" y="1828800"/>
+            <a:ext cx="4580763" cy="4437529"/>
           </a:xfrm>
         </p:spPr>
         <p:txBody>
@@ -5714,52 +5712,31 @@
           </a:bodyPr>
           <a:lstStyle/>
           <a:p>
-            <a:pPr marL="0" indent="0">
-              <a:buNone/>
-            </a:pPr>
+            <a:pPr marL="0" indent="0"/>
+            <a:r>
+              <a:rPr lang="fr-FR" b="1" dirty="0" smtClean="0"/>
+              <a:t>Kinect</a:t>
+            </a:r>
+          </a:p>
+          <a:p>
+            <a:pPr marL="342900" lvl="1" indent="0"/>
             <a:r>
               <a:rPr lang="fr-FR" dirty="0" smtClean="0"/>
-              <a:t>On va travailler avec la Kinect et la caméra embarqué.</a:t>
-            </a:r>
-          </a:p>
-          <a:p>
-            <a:pPr marL="0" indent="0"/>
-            <a:r>
-              <a:rPr lang="fr-FR" b="1" dirty="0" smtClean="0"/>
-              <a:t>Kinect:</a:t>
+              <a:t>Détermination des distances.</a:t>
             </a:r>
           </a:p>
           <a:p>
             <a:pPr marL="342900" lvl="1" indent="0"/>
             <a:r>
               <a:rPr lang="fr-FR" dirty="0" smtClean="0"/>
-              <a:t>Va nous permettre de déterminer les distances avec les objets et le robot.</a:t>
+              <a:t>Localisation des obstacles.</a:t>
             </a:r>
           </a:p>
           <a:p>
             <a:pPr marL="342900" lvl="1" indent="0"/>
             <a:r>
               <a:rPr lang="fr-FR" dirty="0" smtClean="0"/>
-              <a:t>Va nous permettre de déterminer la distance entre les obstacles.</a:t>
-            </a:r>
-          </a:p>
-          <a:p>
-            <a:pPr marL="342900" lvl="1" indent="0"/>
-            <a:r>
-              <a:rPr lang="fr-FR" dirty="0" smtClean="0"/>
-              <a:t>Il faut faire attention au </a:t>
-            </a:r>
-            <a:r>
-              <a:rPr lang="fr-FR" dirty="0" smtClean="0">
-                <a:solidFill>
-                  <a:srgbClr val="FF0000"/>
-                </a:solidFill>
-              </a:rPr>
-              <a:t>zone critique</a:t>
-            </a:r>
-            <a:r>
-              <a:rPr lang="fr-FR" dirty="0" smtClean="0"/>
-              <a:t>!!!( La zone où la Kinect aperçoit un obstacle, tandis que l’autre est en arrière, cela va déboussoler le robot).</a:t>
+              <a:t>Localisation du robot.</a:t>
             </a:r>
           </a:p>
           <a:p>
@@ -5770,6 +5747,36 @@
           </a:p>
         </p:txBody>
       </p:sp>
+      <p:pic>
+        <p:nvPicPr>
+          <p:cNvPr id="4" name="Image 3"/>
+          <p:cNvPicPr>
+            <a:picLocks noChangeAspect="1"/>
+          </p:cNvPicPr>
+          <p:nvPr/>
+        </p:nvPicPr>
+        <p:blipFill>
+          <a:blip r:embed="rId4">
+            <a:extLst>
+              <a:ext uri="{28A0092B-C50C-407E-A947-70E740481C1C}">
+                <a14:useLocalDpi xmlns:a14="http://schemas.microsoft.com/office/drawing/2010/main" val="0"/>
+              </a:ext>
+            </a:extLst>
+          </a:blip>
+          <a:stretch>
+            <a:fillRect/>
+          </a:stretch>
+        </p:blipFill>
+        <p:spPr>
+          <a:xfrm>
+            <a:off x="405765" y="3316225"/>
+            <a:ext cx="8404970" cy="3285744"/>
+          </a:xfrm>
+          <a:prstGeom prst="rect">
+            <a:avLst/>
+          </a:prstGeom>
+        </p:spPr>
+      </p:pic>
     </p:spTree>
     <p:extLst>
       <p:ext uri="{BB962C8B-B14F-4D97-AF65-F5344CB8AC3E}">
@@ -5832,14 +5839,12 @@
         </p:nvSpPr>
         <p:spPr/>
         <p:txBody>
-          <a:bodyPr>
-            <a:normAutofit fontScale="90000"/>
-          </a:bodyPr>
+          <a:bodyPr/>
           <a:lstStyle/>
           <a:p>
             <a:r>
               <a:rPr lang="fr-FR" dirty="0" smtClean="0"/>
-              <a:t>Image IR ET RGB prise avec la Kinect</a:t>
+              <a:t>Orientation et repères</a:t>
             </a:r>
             <a:endParaRPr lang="fr-FR" dirty="0"/>
           </a:p>
@@ -5847,11 +5852,12 @@
       </p:sp>
       <p:sp>
         <p:nvSpPr>
-          <p:cNvPr id="15" name="Espace réservé du contenu 2"/>
-          <p:cNvSpPr txBox="1">
-            <a:spLocks/>
-          </p:cNvSpPr>
-          <p:nvPr>
+          <p:cNvPr id="3" name="Espace réservé du contenu 2"/>
+          <p:cNvSpPr>
+            <a:spLocks noGrp="1"/>
+          </p:cNvSpPr>
+          <p:nvPr>
+            <p:ph idx="1"/>
             <p:custDataLst>
               <p:tags r:id="rId2"/>
             </p:custDataLst>
@@ -5859,61 +5865,49 @@
         </p:nvSpPr>
         <p:spPr>
           <a:xfrm>
-            <a:off x="4318000" y="2660417"/>
-            <a:ext cx="4445000" cy="1060683"/>
+            <a:off x="414528" y="1999488"/>
+            <a:ext cx="4511040" cy="4266841"/>
           </a:xfrm>
-          <a:prstGeom prst="rect">
-            <a:avLst/>
-          </a:prstGeom>
         </p:spPr>
         <p:txBody>
-          <a:bodyPr vert="horz" lIns="91440" tIns="45720" rIns="91440" bIns="45720" rtlCol="0">
+          <a:bodyPr>
             <a:normAutofit/>
           </a:bodyPr>
           <a:lstStyle/>
           <a:p>
-            <a:pPr marL="0" marR="0" lvl="0" indent="0" algn="l" defTabSz="914400" rtl="0" eaLnBrk="1" fontAlgn="auto" latinLnBrk="0" hangingPunct="1">
-              <a:lnSpc>
-                <a:spcPct val="100000"/>
-              </a:lnSpc>
-              <a:spcBef>
-                <a:spcPts val="2000"/>
-              </a:spcBef>
-              <a:spcAft>
-                <a:spcPts val="0"/>
-              </a:spcAft>
-              <a:buClr>
-                <a:schemeClr val="accent1"/>
-              </a:buClr>
-              <a:buSzTx/>
-              <a:buFont typeface="Wingdings 2" pitchFamily="18" charset="2"/>
-              <a:buChar char=""/>
-              <a:tabLst/>
-              <a:defRPr/>
-            </a:pPr>
-            <a:endParaRPr kumimoji="0" lang="fr-FR" sz="2000" b="0" i="0" u="none" strike="noStrike" kern="1200" cap="none" spc="0" normalizeH="0" noProof="0" dirty="0" smtClean="0">
-              <a:ln>
-                <a:noFill/>
-              </a:ln>
-              <a:solidFill>
-                <a:schemeClr val="tx1">
-                  <a:lumMod val="65000"/>
-                  <a:lumOff val="35000"/>
-                </a:schemeClr>
-              </a:solidFill>
-              <a:effectLst/>
-              <a:uLnTx/>
-              <a:uFillTx/>
-              <a:latin typeface="+mn-lt"/>
-              <a:ea typeface="+mn-ea"/>
-              <a:cs typeface="+mn-cs"/>
-            </a:endParaRPr>
+            <a:pPr marL="0" indent="0"/>
+            <a:r>
+              <a:rPr lang="fr-FR" dirty="0" smtClean="0"/>
+              <a:t>Utilisation de caméra embarqué.</a:t>
+            </a:r>
+          </a:p>
+          <a:p>
+            <a:pPr marL="0" indent="0"/>
+            <a:r>
+              <a:rPr lang="fr-FR" dirty="0" smtClean="0"/>
+              <a:t>Utilisation de l’algorithme de Zhang.</a:t>
+            </a:r>
+          </a:p>
+          <a:p>
+            <a:pPr marL="0" indent="0"/>
+            <a:r>
+              <a:rPr lang="fr-FR" dirty="0" smtClean="0"/>
+              <a:t>Détermination de l’angle du robot </a:t>
+            </a:r>
+            <a:r>
+              <a:rPr lang="fr-FR" smtClean="0"/>
+              <a:t>grâce à la </a:t>
+            </a:r>
+            <a:r>
+              <a:rPr lang="fr-FR" dirty="0" smtClean="0"/>
+              <a:t>ligne rouge sur la table.</a:t>
+            </a:r>
           </a:p>
         </p:txBody>
       </p:sp>
       <p:pic>
         <p:nvPicPr>
-          <p:cNvPr id="16" name="Image 15"/>
+          <p:cNvPr id="4" name="Image 3"/>
           <p:cNvPicPr>
             <a:picLocks noChangeAspect="1"/>
           </p:cNvPicPr>
@@ -5933,338 +5927,14 @@
         </p:blipFill>
         <p:spPr>
           <a:xfrm>
-            <a:off x="158496" y="2240280"/>
-            <a:ext cx="4340352" cy="3255264"/>
+            <a:off x="5063109" y="2533840"/>
+            <a:ext cx="3943350" cy="3228975"/>
           </a:xfrm>
           <a:prstGeom prst="rect">
             <a:avLst/>
           </a:prstGeom>
         </p:spPr>
       </p:pic>
-      <p:pic>
-        <p:nvPicPr>
-          <p:cNvPr id="17" name="Image 16"/>
-          <p:cNvPicPr>
-            <a:picLocks noChangeAspect="1"/>
-          </p:cNvPicPr>
-          <p:nvPr/>
-        </p:nvPicPr>
-        <p:blipFill>
-          <a:blip r:embed="rId5">
-            <a:extLst>
-              <a:ext uri="{28A0092B-C50C-407E-A947-70E740481C1C}">
-                <a14:useLocalDpi xmlns:a14="http://schemas.microsoft.com/office/drawing/2010/main" val="0"/>
-              </a:ext>
-            </a:extLst>
-          </a:blip>
-          <a:stretch>
-            <a:fillRect/>
-          </a:stretch>
-        </p:blipFill>
-        <p:spPr>
-          <a:xfrm>
-            <a:off x="4693920" y="2240280"/>
-            <a:ext cx="4290123" cy="3217592"/>
-          </a:xfrm>
-          <a:prstGeom prst="rect">
-            <a:avLst/>
-          </a:prstGeom>
-        </p:spPr>
-      </p:pic>
-    </p:spTree>
-    <p:extLst>
-      <p:ext uri="{BB962C8B-B14F-4D97-AF65-F5344CB8AC3E}">
-        <p14:creationId xmlns:p14="http://schemas.microsoft.com/office/powerpoint/2010/main" val="1143801389"/>
-      </p:ext>
-    </p:extLst>
-  </p:cSld>
-  <p:clrMapOvr>
-    <a:masterClrMapping/>
-  </p:clrMapOvr>
-  <mc:AlternateContent xmlns:mc="http://schemas.openxmlformats.org/markup-compatibility/2006" xmlns:p14="http://schemas.microsoft.com/office/powerpoint/2010/main">
-    <mc:Choice Requires="p14">
-      <p:transition p14:dur="0"/>
-    </mc:Choice>
-    <mc:Fallback xmlns="">
-      <p:transition spd="slow">
-        <p:fade/>
-      </p:transition>
-    </mc:Fallback>
-  </mc:AlternateContent>
-  <p:timing>
-    <p:tnLst>
-      <p:par>
-        <p:cTn id="1" dur="indefinite" restart="never" nodeType="tmRoot"/>
-      </p:par>
-    </p:tnLst>
-  </p:timing>
-</p:sld>
-</file>
-
-<file path=ppt/slides/slide3.xml><?xml version="1.0" encoding="utf-8"?>
-<p:sld xmlns:a="http://schemas.openxmlformats.org/drawingml/2006/main" xmlns:r="http://schemas.openxmlformats.org/officeDocument/2006/relationships" xmlns:p="http://schemas.openxmlformats.org/presentationml/2006/main">
-  <p:cSld>
-    <p:spTree>
-      <p:nvGrpSpPr>
-        <p:cNvPr id="1" name=""/>
-        <p:cNvGrpSpPr/>
-        <p:nvPr/>
-      </p:nvGrpSpPr>
-      <p:grpSpPr>
-        <a:xfrm>
-          <a:off x="0" y="0"/>
-          <a:ext cx="0" cy="0"/>
-          <a:chOff x="0" y="0"/>
-          <a:chExt cx="0" cy="0"/>
-        </a:xfrm>
-      </p:grpSpPr>
-      <p:sp>
-        <p:nvSpPr>
-          <p:cNvPr id="2" name="Titre 1"/>
-          <p:cNvSpPr>
-            <a:spLocks noGrp="1"/>
-          </p:cNvSpPr>
-          <p:nvPr>
-            <p:ph type="title"/>
-            <p:custDataLst>
-              <p:tags r:id="rId1"/>
-            </p:custDataLst>
-          </p:nvPr>
-        </p:nvSpPr>
-        <p:spPr/>
-        <p:txBody>
-          <a:bodyPr/>
-          <a:lstStyle/>
-          <a:p>
-            <a:r>
-              <a:rPr lang="fr-FR" dirty="0" smtClean="0"/>
-              <a:t>Orientation</a:t>
-            </a:r>
-            <a:endParaRPr lang="fr-FR" dirty="0"/>
-          </a:p>
-        </p:txBody>
-      </p:sp>
-      <p:sp>
-        <p:nvSpPr>
-          <p:cNvPr id="3" name="Espace réservé du contenu 2"/>
-          <p:cNvSpPr>
-            <a:spLocks noGrp="1"/>
-          </p:cNvSpPr>
-          <p:nvPr>
-            <p:ph idx="1"/>
-            <p:custDataLst>
-              <p:tags r:id="rId2"/>
-            </p:custDataLst>
-          </p:nvPr>
-        </p:nvSpPr>
-        <p:spPr/>
-        <p:txBody>
-          <a:bodyPr>
-            <a:normAutofit/>
-          </a:bodyPr>
-          <a:lstStyle/>
-          <a:p>
-            <a:pPr marL="0" indent="0"/>
-            <a:r>
-              <a:rPr lang="fr-FR" dirty="0" smtClean="0"/>
-              <a:t>Pour l’orientation du robot, on va utiliser la caméra embarqué pour avoir plus de précision.</a:t>
-            </a:r>
-          </a:p>
-          <a:p>
-            <a:pPr marL="0" indent="0"/>
-            <a:r>
-              <a:rPr lang="fr-FR" dirty="0" smtClean="0"/>
-              <a:t>On a fait la calibration de la caméra avec l’algorithme de Zhang.</a:t>
-            </a:r>
-          </a:p>
-          <a:p>
-            <a:pPr marL="0" indent="0"/>
-            <a:r>
-              <a:rPr lang="fr-FR" dirty="0" smtClean="0"/>
-              <a:t>On va extraire plusieurs paramètres avec le logiciel sur </a:t>
-            </a:r>
-            <a:r>
-              <a:rPr lang="fr-FR" dirty="0"/>
-              <a:t>W</a:t>
-            </a:r>
-            <a:r>
-              <a:rPr lang="fr-FR" dirty="0" smtClean="0"/>
-              <a:t>indows, pour différentes positions de la caméra.</a:t>
-            </a:r>
-          </a:p>
-          <a:p>
-            <a:pPr marL="0" indent="0">
-              <a:buNone/>
-            </a:pPr>
-            <a:endParaRPr lang="fr-FR" dirty="0"/>
-          </a:p>
-        </p:txBody>
-      </p:sp>
-    </p:spTree>
-    <p:extLst>
-      <p:ext uri="{BB962C8B-B14F-4D97-AF65-F5344CB8AC3E}">
-        <p14:creationId xmlns:p14="http://schemas.microsoft.com/office/powerpoint/2010/main" val="1143801389"/>
-      </p:ext>
-    </p:extLst>
-  </p:cSld>
-  <p:clrMapOvr>
-    <a:masterClrMapping/>
-  </p:clrMapOvr>
-  <mc:AlternateContent xmlns:mc="http://schemas.openxmlformats.org/markup-compatibility/2006" xmlns:p14="http://schemas.microsoft.com/office/powerpoint/2010/main">
-    <mc:Choice Requires="p14">
-      <p:transition p14:dur="0"/>
-    </mc:Choice>
-    <mc:Fallback xmlns="">
-      <p:transition spd="slow">
-        <p:fade/>
-      </p:transition>
-    </mc:Fallback>
-  </mc:AlternateContent>
-  <p:timing>
-    <p:tnLst>
-      <p:par>
-        <p:cTn id="1" dur="indefinite" restart="never" nodeType="tmRoot"/>
-      </p:par>
-    </p:tnLst>
-  </p:timing>
-</p:sld>
-</file>
-
-<file path=ppt/slides/slide4.xml><?xml version="1.0" encoding="utf-8"?>
-<p:sld xmlns:a="http://schemas.openxmlformats.org/drawingml/2006/main" xmlns:r="http://schemas.openxmlformats.org/officeDocument/2006/relationships" xmlns:p="http://schemas.openxmlformats.org/presentationml/2006/main">
-  <p:cSld>
-    <p:spTree>
-      <p:nvGrpSpPr>
-        <p:cNvPr id="1" name=""/>
-        <p:cNvGrpSpPr/>
-        <p:nvPr/>
-      </p:nvGrpSpPr>
-      <p:grpSpPr>
-        <a:xfrm>
-          <a:off x="0" y="0"/>
-          <a:ext cx="0" cy="0"/>
-          <a:chOff x="0" y="0"/>
-          <a:chExt cx="0" cy="0"/>
-        </a:xfrm>
-      </p:grpSpPr>
-      <p:sp>
-        <p:nvSpPr>
-          <p:cNvPr id="2" name="Titre 1"/>
-          <p:cNvSpPr>
-            <a:spLocks noGrp="1"/>
-          </p:cNvSpPr>
-          <p:nvPr>
-            <p:ph type="title"/>
-            <p:custDataLst>
-              <p:tags r:id="rId1"/>
-            </p:custDataLst>
-          </p:nvPr>
-        </p:nvSpPr>
-        <p:spPr/>
-        <p:txBody>
-          <a:bodyPr/>
-          <a:lstStyle/>
-          <a:p>
-            <a:r>
-              <a:rPr lang="fr-FR" dirty="0" smtClean="0"/>
-              <a:t>Repères pour l’orientation</a:t>
-            </a:r>
-            <a:endParaRPr lang="fr-FR" dirty="0"/>
-          </a:p>
-        </p:txBody>
-      </p:sp>
-      <p:sp>
-        <p:nvSpPr>
-          <p:cNvPr id="3" name="Espace réservé du contenu 2"/>
-          <p:cNvSpPr>
-            <a:spLocks noGrp="1"/>
-          </p:cNvSpPr>
-          <p:nvPr>
-            <p:ph idx="1"/>
-            <p:custDataLst>
-              <p:tags r:id="rId2"/>
-            </p:custDataLst>
-          </p:nvPr>
-        </p:nvSpPr>
-        <p:spPr/>
-        <p:txBody>
-          <a:bodyPr>
-            <a:normAutofit/>
-          </a:bodyPr>
-          <a:lstStyle/>
-          <a:p>
-            <a:pPr marL="0" indent="0"/>
-            <a:r>
-              <a:rPr lang="fr-FR" dirty="0" smtClean="0"/>
-              <a:t>La ligne rouge sur la table: Cette ligne va nous permettre d’orienter notre robot grâce à des règles de trigonométrie.</a:t>
-            </a:r>
-          </a:p>
-          <a:p>
-            <a:pPr marL="0" indent="0"/>
-            <a:r>
-              <a:rPr lang="fr-FR" dirty="0" smtClean="0"/>
-              <a:t> Les coins de la table(bleu et orange</a:t>
-            </a:r>
-            <a:r>
-              <a:rPr lang="fr-FR" dirty="0" smtClean="0"/>
-              <a:t>).Dans </a:t>
-            </a:r>
-            <a:r>
-              <a:rPr lang="fr-FR" dirty="0" smtClean="0"/>
-              <a:t>cette partie on va programmer la caméra à ce qu’elle prenne plusieurs </a:t>
-            </a:r>
-            <a:r>
-              <a:rPr lang="fr-FR" dirty="0" smtClean="0"/>
-              <a:t>photos</a:t>
-            </a:r>
-            <a:r>
-              <a:rPr lang="fr-FR" dirty="0" smtClean="0"/>
-              <a:t>, jusqu’à </a:t>
-            </a:r>
-            <a:r>
-              <a:rPr lang="fr-FR" dirty="0" smtClean="0"/>
-              <a:t>l’obtention de l’orientation </a:t>
-            </a:r>
-            <a:r>
-              <a:rPr lang="fr-FR" dirty="0" smtClean="0"/>
-              <a:t>du </a:t>
-            </a:r>
-            <a:r>
-              <a:rPr lang="fr-FR" dirty="0" smtClean="0"/>
-              <a:t>robot:</a:t>
-            </a:r>
-          </a:p>
-          <a:p>
-            <a:pPr marL="342900" lvl="1" indent="0"/>
-            <a:r>
-              <a:rPr lang="fr-FR" dirty="0" smtClean="0"/>
-              <a:t>N: On voit le coin orange avant le bleu.</a:t>
-            </a:r>
-          </a:p>
-          <a:p>
-            <a:pPr marL="342900" lvl="1" indent="0"/>
-            <a:r>
-              <a:rPr lang="fr-FR" dirty="0" smtClean="0"/>
-              <a:t> S: On voit le coin bleu avant l’orange.</a:t>
-            </a:r>
-          </a:p>
-          <a:p>
-            <a:pPr marL="342900" lvl="1" indent="0"/>
-            <a:r>
-              <a:rPr lang="fr-FR" dirty="0" smtClean="0"/>
-              <a:t> E: On voit les deux coins bleus.</a:t>
-            </a:r>
-          </a:p>
-          <a:p>
-            <a:pPr marL="342900" lvl="1" indent="0"/>
-            <a:r>
-              <a:rPr lang="fr-FR" dirty="0" smtClean="0"/>
-              <a:t>O: On voit les deux coins oranges.</a:t>
-            </a:r>
-            <a:endParaRPr lang="fr-FR" dirty="0"/>
-          </a:p>
-        </p:txBody>
-      </p:sp>
     </p:spTree>
     <p:extLst>
       <p:ext uri="{BB962C8B-B14F-4D97-AF65-F5344CB8AC3E}">
@@ -6314,30 +5984,6 @@
 </file>
 
 <file path=ppt/tags/tag4.xml><?xml version="1.0" encoding="utf-8"?>
-<p:tagLst xmlns:a="http://schemas.openxmlformats.org/drawingml/2006/main" xmlns:r="http://schemas.openxmlformats.org/officeDocument/2006/relationships" xmlns:p="http://schemas.openxmlformats.org/presentationml/2006/main">
-  <p:tag name="NUM" val="13"/>
-</p:tagLst>
-</file>
-
-<file path=ppt/tags/tag5.xml><?xml version="1.0" encoding="utf-8"?>
-<p:tagLst xmlns:a="http://schemas.openxmlformats.org/drawingml/2006/main" xmlns:r="http://schemas.openxmlformats.org/officeDocument/2006/relationships" xmlns:p="http://schemas.openxmlformats.org/presentationml/2006/main">
-  <p:tag name="NUM" val="1"/>
-</p:tagLst>
-</file>
-
-<file path=ppt/tags/tag6.xml><?xml version="1.0" encoding="utf-8"?>
-<p:tagLst xmlns:a="http://schemas.openxmlformats.org/drawingml/2006/main" xmlns:r="http://schemas.openxmlformats.org/officeDocument/2006/relationships" xmlns:p="http://schemas.openxmlformats.org/presentationml/2006/main">
-  <p:tag name="NUM" val="2"/>
-</p:tagLst>
-</file>
-
-<file path=ppt/tags/tag7.xml><?xml version="1.0" encoding="utf-8"?>
-<p:tagLst xmlns:a="http://schemas.openxmlformats.org/drawingml/2006/main" xmlns:r="http://schemas.openxmlformats.org/officeDocument/2006/relationships" xmlns:p="http://schemas.openxmlformats.org/presentationml/2006/main">
-  <p:tag name="NUM" val="1"/>
-</p:tagLst>
-</file>
-
-<file path=ppt/tags/tag8.xml><?xml version="1.0" encoding="utf-8"?>
 <p:tagLst xmlns:a="http://schemas.openxmlformats.org/drawingml/2006/main" xmlns:r="http://schemas.openxmlformats.org/officeDocument/2006/relationships" xmlns:p="http://schemas.openxmlformats.org/presentationml/2006/main">
   <p:tag name="NUM" val="2"/>
 </p:tagLst>

</xml_diff>